<commit_message>
fix: added correct titles and adjusted figure
</commit_message>
<xml_diff>
--- a/bi_and_data_viz/Competitive Analysis for UWE Bristol_.pptx
+++ b/bi_and_data_viz/Competitive Analysis for UWE Bristol_.pptx
@@ -153,12 +153,7 @@
 <file path=ppt/revisionInfo.xml><?xml version="1.0" encoding="utf-8"?>
 <p1510:revInfo xmlns:a="http://schemas.openxmlformats.org/drawingml/2006/main" xmlns:r="http://schemas.openxmlformats.org/officeDocument/2006/relationships" xmlns:p1510="http://schemas.microsoft.com/office/powerpoint/2015/10/main">
   <p1510:revLst>
-    <p1510:client id="{0885CF65-AE1F-0C2E-184C-DE280E615B7D}" v="65" dt="2025-01-13T20:26:43.389"/>
-    <p1510:client id="{0FB56D3A-BFA8-AEE8-A571-4A1866DB160B}" v="6" dt="2025-01-13T20:06:02.532"/>
-    <p1510:client id="{934C4FB9-24FE-CB53-A18B-47EADAF970CC}" v="591" dt="2025-01-14T10:49:58.646"/>
-    <p1510:client id="{E364C1D0-C116-032E-6822-53BCA3F219B7}" v="34" dt="2025-01-12T19:25:39.676"/>
-    <p1510:client id="{EF3FA1A4-2EE7-6DD3-1F48-B49BA60C1EB6}" v="86" dt="2025-01-14T09:40:34.954"/>
-    <p1510:client id="{F0C0C90F-5210-CA25-B2F8-DD9A843B823E}" v="2573" dt="2025-01-14T13:40:09.719"/>
+    <p1510:client id="{844BD9D1-36A3-10C4-B808-8A26E9808E1D}" v="61" dt="2025-01-17T11:08:44.566"/>
   </p1510:revLst>
 </p1510:revInfo>
 </file>
@@ -15962,7 +15957,7 @@
           <a:p>
             <a:fld id="{1C36513B-EBB8-49B6-BD8F-2652FE9ECEC6}" type="datetimeFigureOut">
               <a:rPr lang="en-GB" smtClean="0"/>
-              <a:t>14/01/2025</a:t>
+              <a:t>17/01/2025</a:t>
             </a:fld>
             <a:endParaRPr lang="en-GB"/>
           </a:p>
@@ -17858,7 +17853,7 @@
           <a:p>
             <a:fld id="{03F1FFC4-4BD7-4723-ABB8-1CA8FEEB2BEF}" type="datetime5">
               <a:rPr lang="en-GB" smtClean="0"/>
-              <a:t>14-Jan-25</a:t>
+              <a:t>17-Jan-25</a:t>
             </a:fld>
             <a:endParaRPr lang="en-GB"/>
           </a:p>
@@ -18115,7 +18110,7 @@
           <a:p>
             <a:fld id="{02EE4D8A-4AE0-44A1-A702-01B049E5D9F6}" type="datetime5">
               <a:rPr lang="en-GB" smtClean="0"/>
-              <a:t>14-Jan-25</a:t>
+              <a:t>17-Jan-25</a:t>
             </a:fld>
             <a:endParaRPr lang="en-GB"/>
           </a:p>
@@ -18238,7 +18233,7 @@
           <a:p>
             <a:fld id="{A1C2DCDB-9721-4878-BF58-3FBA6895CED8}" type="datetime5">
               <a:rPr lang="en-GB" smtClean="0"/>
-              <a:t>14-Jan-25</a:t>
+              <a:t>17-Jan-25</a:t>
             </a:fld>
             <a:endParaRPr lang="en-GB"/>
           </a:p>
@@ -18675,7 +18670,7 @@
           <a:p>
             <a:fld id="{CCC9EF8E-048C-4334-AD80-D83F6C532D96}" type="datetime5">
               <a:rPr lang="en-GB" smtClean="0"/>
-              <a:t>14-Jan-25</a:t>
+              <a:t>17-Jan-25</a:t>
             </a:fld>
             <a:endParaRPr lang="en-GB"/>
           </a:p>
@@ -19154,7 +19149,7 @@
           <a:p>
             <a:fld id="{CCC9EF8E-048C-4334-AD80-D83F6C532D96}" type="datetime5">
               <a:rPr lang="en-GB" smtClean="0"/>
-              <a:t>14-Jan-25</a:t>
+              <a:t>17-Jan-25</a:t>
             </a:fld>
             <a:endParaRPr lang="en-GB"/>
           </a:p>
@@ -19604,7 +19599,7 @@
           <a:p>
             <a:fld id="{CCC9EF8E-048C-4334-AD80-D83F6C532D96}" type="datetime5">
               <a:rPr lang="en-GB" smtClean="0"/>
-              <a:t>14-Jan-25</a:t>
+              <a:t>17-Jan-25</a:t>
             </a:fld>
             <a:endParaRPr lang="en-GB"/>
           </a:p>
@@ -19896,7 +19891,7 @@
           <a:p>
             <a:fld id="{66BE9E39-D550-4951-9818-55D401126FCD}" type="datetime5">
               <a:rPr lang="en-GB" smtClean="0"/>
-              <a:t>14-Jan-25</a:t>
+              <a:t>17-Jan-25</a:t>
             </a:fld>
             <a:endParaRPr lang="en-GB"/>
           </a:p>
@@ -21059,7 +21054,7 @@
           <a:p>
             <a:fld id="{8AEAAFD9-E057-47C0-9571-8C4815721903}" type="datetime5">
               <a:rPr lang="en-GB" smtClean="0"/>
-              <a:t>14-Jan-25</a:t>
+              <a:t>17-Jan-25</a:t>
             </a:fld>
             <a:endParaRPr lang="en-GB"/>
           </a:p>
@@ -21980,7 +21975,7 @@
           <a:p>
             <a:fld id="{E2CA3675-AFAB-48CB-861B-E0B3C82FC417}" type="datetime5">
               <a:rPr lang="en-GB" smtClean="0"/>
-              <a:t>14-Jan-25</a:t>
+              <a:t>17-Jan-25</a:t>
             </a:fld>
             <a:endParaRPr lang="en-GB"/>
           </a:p>
@@ -21998,23 +21993,75 @@
         </p:nvSpPr>
         <p:spPr/>
         <p:txBody>
-          <a:bodyPr>
+          <a:bodyPr lIns="91440" tIns="45720" rIns="91440" bIns="45720" anchor="t" anchorCtr="0">
             <a:normAutofit/>
           </a:bodyPr>
           <a:lstStyle/>
           <a:p>
             <a:r>
-              <a:rPr lang="lv-LV"/>
-              <a:t>Name of the programme</a:t>
+              <a:rPr lang="lv-LV" dirty="0" err="1">
+                <a:ea typeface="+mj-lt"/>
+                <a:cs typeface="+mj-lt"/>
+              </a:rPr>
+              <a:t>Business</a:t>
             </a:r>
-            <a:endParaRPr lang="en-US"/>
-          </a:p>
-          <a:p>
             <a:r>
-              <a:rPr lang="en-US"/>
-              <a:t>Course</a:t>
+              <a:rPr lang="lv-LV" dirty="0">
+                <a:ea typeface="+mj-lt"/>
+                <a:cs typeface="+mj-lt"/>
+              </a:rPr>
+              <a:t> </a:t>
             </a:r>
-            <a:endParaRPr lang="en-GB"/>
+            <a:r>
+              <a:rPr lang="lv-LV" dirty="0" err="1">
+                <a:ea typeface="+mj-lt"/>
+                <a:cs typeface="+mj-lt"/>
+              </a:rPr>
+              <a:t>Intelligence</a:t>
+            </a:r>
+            <a:r>
+              <a:rPr lang="lv-LV" dirty="0">
+                <a:ea typeface="+mj-lt"/>
+                <a:cs typeface="+mj-lt"/>
+              </a:rPr>
+              <a:t> </a:t>
+            </a:r>
+            <a:r>
+              <a:rPr lang="lv-LV" dirty="0" err="1">
+                <a:ea typeface="+mj-lt"/>
+                <a:cs typeface="+mj-lt"/>
+              </a:rPr>
+              <a:t>and</a:t>
+            </a:r>
+            <a:r>
+              <a:rPr lang="lv-LV" dirty="0">
+                <a:ea typeface="+mj-lt"/>
+                <a:cs typeface="+mj-lt"/>
+              </a:rPr>
+              <a:t> </a:t>
+            </a:r>
+            <a:r>
+              <a:rPr lang="lv-LV" dirty="0" err="1">
+                <a:ea typeface="+mj-lt"/>
+                <a:cs typeface="+mj-lt"/>
+              </a:rPr>
+              <a:t>Data</a:t>
+            </a:r>
+            <a:r>
+              <a:rPr lang="lv-LV" dirty="0">
+                <a:ea typeface="+mj-lt"/>
+                <a:cs typeface="+mj-lt"/>
+              </a:rPr>
+              <a:t> </a:t>
+            </a:r>
+            <a:r>
+              <a:rPr lang="lv-LV" dirty="0" err="1">
+                <a:ea typeface="+mj-lt"/>
+                <a:cs typeface="+mj-lt"/>
+              </a:rPr>
+              <a:t>Visualisation</a:t>
+            </a:r>
+            <a:endParaRPr lang="en-US" dirty="0" err="1"/>
           </a:p>
           <a:p>
             <a:endParaRPr lang="en-GB"/>
@@ -22134,7 +22181,7 @@
           <a:p>
             <a:fld id="{CCC9EF8E-048C-4334-AD80-D83F6C532D96}" type="datetime5">
               <a:rPr lang="en-GB" smtClean="0"/>
-              <a:t>14-Jan-25</a:t>
+              <a:t>17-Jan-25</a:t>
             </a:fld>
             <a:endParaRPr lang="en-GB"/>
           </a:p>
@@ -22461,8 +22508,8 @@
         </p:blipFill>
         <p:spPr>
           <a:xfrm>
-            <a:off x="842962" y="2628744"/>
-            <a:ext cx="3185878" cy="1815995"/>
+            <a:off x="454773" y="2231595"/>
+            <a:ext cx="4347928" cy="2463695"/>
           </a:xfrm>
           <a:prstGeom prst="rect">
             <a:avLst/>
@@ -22491,8 +22538,8 @@
         </p:blipFill>
         <p:spPr>
           <a:xfrm>
-            <a:off x="6357938" y="2428875"/>
-            <a:ext cx="1000125" cy="2000250"/>
+            <a:off x="6224588" y="2466975"/>
+            <a:ext cx="1247775" cy="2533650"/>
           </a:xfrm>
           <a:prstGeom prst="rect">
             <a:avLst/>
@@ -22562,7 +22609,7 @@
         </p:nvSpPr>
         <p:spPr>
           <a:xfrm>
-            <a:off x="455640" y="4606631"/>
+            <a:off x="608040" y="4787606"/>
             <a:ext cx="3967842" cy="553998"/>
           </a:xfrm>
           <a:prstGeom prst="rect">
@@ -22656,7 +22703,7 @@
         </p:nvSpPr>
         <p:spPr>
           <a:xfrm>
-            <a:off x="4877738" y="4484836"/>
+            <a:off x="4858688" y="4999186"/>
             <a:ext cx="3967842" cy="861774"/>
           </a:xfrm>
           <a:prstGeom prst="rect">
@@ -22808,7 +22855,7 @@
           <a:p>
             <a:fld id="{CCC9EF8E-048C-4334-AD80-D83F6C532D96}" type="datetime5">
               <a:rPr lang="en-GB" smtClean="0"/>
-              <a:t>14-Jan-25</a:t>
+              <a:t>17-Jan-25</a:t>
             </a:fld>
             <a:endParaRPr lang="en-GB"/>
           </a:p>
@@ -23154,7 +23201,7 @@
           <a:p>
             <a:fld id="{CCC9EF8E-048C-4334-AD80-D83F6C532D96}" type="datetime5">
               <a:rPr lang="en-GB" smtClean="0"/>
-              <a:t>14-Jan-25</a:t>
+              <a:t>17-Jan-25</a:t>
             </a:fld>
             <a:endParaRPr lang="en-GB"/>
           </a:p>
@@ -23378,7 +23425,7 @@
           <a:p>
             <a:fld id="{CCC9EF8E-048C-4334-AD80-D83F6C532D96}" type="datetime5">
               <a:rPr lang="en-GB" smtClean="0"/>
-              <a:t>14-Jan-25</a:t>
+              <a:t>17-Jan-25</a:t>
             </a:fld>
             <a:endParaRPr lang="en-GB"/>
           </a:p>
@@ -23647,7 +23694,7 @@
           <a:p>
             <a:fld id="{CCC9EF8E-048C-4334-AD80-D83F6C532D96}" type="datetime5">
               <a:rPr lang="en-GB" smtClean="0"/>
-              <a:t>14-Jan-25</a:t>
+              <a:t>17-Jan-25</a:t>
             </a:fld>
             <a:endParaRPr lang="en-GB"/>
           </a:p>
@@ -23899,11 +23946,11 @@
           <a:p>
             <a:pPr algn="ctr"/>
             <a:r>
-              <a:rPr lang="en-US" sz="1000"/>
+              <a:rPr lang="en-US" sz="1000" dirty="0"/>
               <a:t>Fig 10. </a:t>
             </a:r>
             <a:r>
-              <a:rPr lang="en-US" sz="1000">
+              <a:rPr lang="en-US" sz="1000" dirty="0">
                 <a:ea typeface="+mn-lt"/>
                 <a:cs typeface="+mn-lt"/>
               </a:rPr>
@@ -23913,41 +23960,41 @@
           <a:p>
             <a:pPr algn="ctr"/>
             <a:r>
-              <a:rPr lang="en-US" sz="1000">
+              <a:rPr lang="en-US" sz="1000" dirty="0">
                 <a:ea typeface="+mn-lt"/>
                 <a:cs typeface="+mn-lt"/>
               </a:rPr>
               <a:t>Summary: All Competitors had a ranking that fluctuated between 51 and 66, consistently trailing UWE </a:t>
             </a:r>
             <a:r>
-              <a:rPr lang="en-US" sz="1000" b="1">
+              <a:rPr lang="en-US" sz="1000" b="1" dirty="0">
                 <a:ea typeface="+mn-lt"/>
                 <a:cs typeface="+mn-lt"/>
               </a:rPr>
-              <a:t>Bristol after 2017. </a:t>
+              <a:t>Bristol after 2018. </a:t>
             </a:r>
             <a:r>
-              <a:rPr lang="en-US" sz="1000">
+              <a:rPr lang="en-US" sz="1000" dirty="0">
                 <a:ea typeface="+mn-lt"/>
                 <a:cs typeface="+mn-lt"/>
               </a:rPr>
               <a:t>UWE average rank from 2011-2024 was </a:t>
             </a:r>
             <a:r>
-              <a:rPr lang="en-US" sz="1000" b="1">
+              <a:rPr lang="en-US" sz="1000" b="1" dirty="0">
                 <a:ea typeface="+mn-lt"/>
                 <a:cs typeface="+mn-lt"/>
               </a:rPr>
               <a:t>better</a:t>
             </a:r>
             <a:r>
-              <a:rPr lang="en-US" sz="1000">
+              <a:rPr lang="en-US" sz="1000" dirty="0">
                 <a:ea typeface="+mn-lt"/>
                 <a:cs typeface="+mn-lt"/>
               </a:rPr>
               <a:t> than the average of All Competitors</a:t>
             </a:r>
-            <a:endParaRPr lang="en-US" sz="1000" b="1">
+            <a:endParaRPr lang="en-US" sz="1000" b="1" dirty="0">
               <a:ea typeface="Calibri"/>
               <a:cs typeface="Calibri"/>
             </a:endParaRPr>
@@ -24031,7 +24078,7 @@
           <a:p>
             <a:fld id="{CCC9EF8E-048C-4334-AD80-D83F6C532D96}" type="datetime5">
               <a:rPr lang="en-GB" smtClean="0"/>
-              <a:t>14-Jan-25</a:t>
+              <a:t>17-Jan-25</a:t>
             </a:fld>
             <a:endParaRPr lang="en-GB"/>
           </a:p>
@@ -24286,11 +24333,11 @@
           <a:p>
             <a:pPr algn="ctr"/>
             <a:r>
-              <a:rPr lang="en-US" sz="1000"/>
+              <a:rPr lang="en-US" sz="1000" dirty="0"/>
               <a:t>Fig 11. </a:t>
             </a:r>
             <a:r>
-              <a:rPr lang="en-US" sz="1000">
+              <a:rPr lang="en-US" sz="1000" dirty="0">
                 <a:ea typeface="+mn-lt"/>
                 <a:cs typeface="+mn-lt"/>
               </a:rPr>
@@ -24300,41 +24347,41 @@
           <a:p>
             <a:pPr algn="ctr"/>
             <a:r>
-              <a:rPr lang="en-US" sz="1000">
+              <a:rPr lang="en-US" sz="1000" dirty="0">
                 <a:ea typeface="+mn-lt"/>
                 <a:cs typeface="+mn-lt"/>
               </a:rPr>
               <a:t>Summary: Longlist Competitors had a ranking that fluctuated between 37 and 60, consistently trailing UWE Bristol </a:t>
             </a:r>
             <a:r>
-              <a:rPr lang="en-US" sz="1000" b="1">
+              <a:rPr lang="en-US" sz="1000" b="1" dirty="0">
                 <a:ea typeface="+mn-lt"/>
                 <a:cs typeface="+mn-lt"/>
               </a:rPr>
-              <a:t>after 2018</a:t>
+              <a:t>after 2019</a:t>
             </a:r>
             <a:r>
-              <a:rPr lang="en-US" sz="1000">
+              <a:rPr lang="en-US" sz="1000" dirty="0">
                 <a:ea typeface="+mn-lt"/>
                 <a:cs typeface="+mn-lt"/>
               </a:rPr>
               <a:t>. UWE average rank from 2011-2024 was </a:t>
             </a:r>
             <a:r>
-              <a:rPr lang="en-US" sz="1000" b="1">
+              <a:rPr lang="en-US" sz="1000" b="1" dirty="0">
                 <a:ea typeface="+mn-lt"/>
                 <a:cs typeface="+mn-lt"/>
               </a:rPr>
               <a:t>close to</a:t>
             </a:r>
             <a:r>
-              <a:rPr lang="en-US" sz="1000">
+              <a:rPr lang="en-US" sz="1000" dirty="0">
                 <a:ea typeface="+mn-lt"/>
                 <a:cs typeface="+mn-lt"/>
               </a:rPr>
               <a:t> the average of Longlist Competitors</a:t>
             </a:r>
-            <a:endParaRPr lang="en-US" sz="1000">
+            <a:endParaRPr lang="en-US" sz="1000" dirty="0">
               <a:ea typeface="Calibri"/>
               <a:cs typeface="Calibri"/>
             </a:endParaRPr>
@@ -24476,7 +24523,7 @@
           <a:p>
             <a:fld id="{CCC9EF8E-048C-4334-AD80-D83F6C532D96}" type="datetime5">
               <a:rPr lang="en-GB" smtClean="0"/>
-              <a:t>14-Jan-25</a:t>
+              <a:t>17-Jan-25</a:t>
             </a:fld>
             <a:endParaRPr lang="en-GB"/>
           </a:p>
@@ -24790,7 +24837,7 @@
           <a:p>
             <a:fld id="{CCC9EF8E-048C-4334-AD80-D83F6C532D96}" type="datetime5">
               <a:rPr lang="en-GB" smtClean="0"/>
-              <a:t>14-Jan-25</a:t>
+              <a:t>17-Jan-25</a:t>
             </a:fld>
             <a:endParaRPr lang="en-GB"/>
           </a:p>
@@ -25036,11 +25083,11 @@
           <a:p>
             <a:pPr algn="ctr"/>
             <a:r>
-              <a:rPr lang="en-US" sz="1000"/>
+              <a:rPr lang="en-US" sz="1000" dirty="0"/>
               <a:t>Fig 13. </a:t>
             </a:r>
             <a:r>
-              <a:rPr lang="en-US" sz="1000">
+              <a:rPr lang="en-US" sz="1000" dirty="0">
                 <a:ea typeface="+mn-lt"/>
                 <a:cs typeface="+mn-lt"/>
               </a:rPr>
@@ -25050,39 +25097,39 @@
           <a:p>
             <a:pPr algn="ctr"/>
             <a:r>
-              <a:rPr lang="en-US" sz="1000">
+              <a:rPr lang="en-US" sz="1000" dirty="0">
                 <a:ea typeface="+mn-lt"/>
                 <a:cs typeface="+mn-lt"/>
               </a:rPr>
               <a:t>Summary: UWE Bristol's employment rate </a:t>
             </a:r>
             <a:r>
-              <a:rPr lang="en-US" sz="1000" b="1">
+              <a:rPr lang="en-US" sz="1000" b="1" dirty="0">
                 <a:ea typeface="+mn-lt"/>
                 <a:cs typeface="+mn-lt"/>
               </a:rPr>
               <a:t>closely tracks</a:t>
             </a:r>
             <a:r>
-              <a:rPr lang="en-US" sz="1000">
+              <a:rPr lang="en-US" sz="1000" dirty="0">
                 <a:ea typeface="+mn-lt"/>
                 <a:cs typeface="+mn-lt"/>
               </a:rPr>
               <a:t> that of all competitors, with marginal fluctuations. Both trends improve over time. UWE average employment rate from 2011-2024 was </a:t>
             </a:r>
             <a:r>
-              <a:rPr lang="en-US" sz="1000" b="1">
+              <a:rPr lang="en-US" sz="1000" b="1" dirty="0">
                 <a:ea typeface="+mn-lt"/>
                 <a:cs typeface="+mn-lt"/>
               </a:rPr>
               <a:t>close to </a:t>
             </a:r>
             <a:r>
-              <a:rPr lang="en-US" sz="1000">
+              <a:rPr lang="en-US" sz="1000" dirty="0">
                 <a:ea typeface="+mn-lt"/>
                 <a:cs typeface="+mn-lt"/>
               </a:rPr>
-              <a:t>the average of Shortlist Competitors</a:t>
+              <a:t>the average of All Competitors</a:t>
             </a:r>
           </a:p>
           <a:p>
@@ -25229,7 +25276,7 @@
           <a:p>
             <a:fld id="{CCC9EF8E-048C-4334-AD80-D83F6C532D96}" type="datetime5">
               <a:rPr lang="en-GB" smtClean="0"/>
-              <a:t>14-Jan-25</a:t>
+              <a:t>17-Jan-25</a:t>
             </a:fld>
             <a:endParaRPr lang="en-GB"/>
           </a:p>
@@ -25467,11 +25514,11 @@
           <a:p>
             <a:pPr algn="ctr"/>
             <a:r>
-              <a:rPr lang="en-US" sz="1000"/>
+              <a:rPr lang="en-US" sz="1000" dirty="0"/>
               <a:t>Fig 14. </a:t>
             </a:r>
             <a:r>
-              <a:rPr lang="en-US" sz="1000">
+              <a:rPr lang="en-US" sz="1000" dirty="0">
                 <a:ea typeface="+mn-lt"/>
                 <a:cs typeface="+mn-lt"/>
               </a:rPr>
@@ -25481,39 +25528,39 @@
           <a:p>
             <a:pPr algn="ctr"/>
             <a:r>
-              <a:rPr lang="en-US" sz="1000">
+              <a:rPr lang="en-US" sz="1000" dirty="0">
                 <a:ea typeface="+mn-lt"/>
                 <a:cs typeface="+mn-lt"/>
               </a:rPr>
-              <a:t>Summary: Shortlist Competitors' employment rate generally </a:t>
+              <a:t>Summary: Longlist Competitors' employment rate generally </a:t>
             </a:r>
             <a:r>
-              <a:rPr lang="en-US" sz="1000" b="1">
+              <a:rPr lang="en-US" sz="1000" b="1" dirty="0">
                 <a:ea typeface="+mn-lt"/>
                 <a:cs typeface="+mn-lt"/>
               </a:rPr>
               <a:t>leads</a:t>
             </a:r>
             <a:r>
-              <a:rPr lang="en-US" sz="1000">
+              <a:rPr lang="en-US" sz="1000" dirty="0">
                 <a:ea typeface="+mn-lt"/>
                 <a:cs typeface="+mn-lt"/>
               </a:rPr>
               <a:t> UWE Bristol, but trends upward. UWE average employment rate from 2011-2024 was </a:t>
             </a:r>
             <a:r>
-              <a:rPr lang="en-US" sz="1000" b="1">
+              <a:rPr lang="en-US" sz="1000" b="1" dirty="0">
                 <a:ea typeface="+mn-lt"/>
                 <a:cs typeface="+mn-lt"/>
               </a:rPr>
               <a:t>worse </a:t>
             </a:r>
             <a:r>
-              <a:rPr lang="en-US" sz="1000">
+              <a:rPr lang="en-US" sz="1000" dirty="0">
                 <a:ea typeface="+mn-lt"/>
                 <a:cs typeface="+mn-lt"/>
               </a:rPr>
-              <a:t>than the average of Shortlist Competitors</a:t>
+              <a:t>than the average of Longlist Competitors</a:t>
             </a:r>
           </a:p>
           <a:p>
@@ -25707,7 +25754,7 @@
           <a:p>
             <a:fld id="{CCC9EF8E-048C-4334-AD80-D83F6C532D96}" type="datetime5">
               <a:rPr lang="en-GB" smtClean="0"/>
-              <a:t>14-Jan-25</a:t>
+              <a:t>17-Jan-25</a:t>
             </a:fld>
             <a:endParaRPr lang="en-GB"/>
           </a:p>
@@ -26404,7 +26451,7 @@
           <a:p>
             <a:fld id="{CCC9EF8E-048C-4334-AD80-D83F6C532D96}" type="datetime5">
               <a:rPr lang="en-GB" smtClean="0"/>
-              <a:t>14-Jan-25</a:t>
+              <a:t>17-Jan-25</a:t>
             </a:fld>
             <a:endParaRPr lang="en-GB"/>
           </a:p>
@@ -26603,7 +26650,7 @@
           <a:p>
             <a:fld id="{CCC9EF8E-048C-4334-AD80-D83F6C532D96}" type="datetime5">
               <a:rPr lang="en-GB" smtClean="0"/>
-              <a:t>14-Jan-25</a:t>
+              <a:t>17-Jan-25</a:t>
             </a:fld>
             <a:endParaRPr lang="en-GB"/>
           </a:p>
@@ -26831,7 +26878,7 @@
           <a:p>
             <a:fld id="{CCC9EF8E-048C-4334-AD80-D83F6C532D96}" type="datetime5">
               <a:rPr lang="en-GB" smtClean="0"/>
-              <a:t>14-Jan-25</a:t>
+              <a:t>17-Jan-25</a:t>
             </a:fld>
             <a:endParaRPr lang="en-GB"/>
           </a:p>
@@ -27234,7 +27281,7 @@
           <a:p>
             <a:fld id="{CCC9EF8E-048C-4334-AD80-D83F6C532D96}" type="datetime5">
               <a:rPr lang="en-GB" smtClean="0"/>
-              <a:t>14-Jan-25</a:t>
+              <a:t>17-Jan-25</a:t>
             </a:fld>
             <a:endParaRPr lang="en-GB"/>
           </a:p>
@@ -27455,7 +27502,7 @@
           <a:p>
             <a:fld id="{CCC9EF8E-048C-4334-AD80-D83F6C532D96}" type="datetime5">
               <a:rPr lang="en-GB" smtClean="0"/>
-              <a:t>14-Jan-25</a:t>
+              <a:t>17-Jan-25</a:t>
             </a:fld>
             <a:endParaRPr lang="en-GB"/>
           </a:p>
@@ -27710,7 +27757,7 @@
           <a:p>
             <a:fld id="{CCC9EF8E-048C-4334-AD80-D83F6C532D96}" type="datetime5">
               <a:rPr lang="en-GB" smtClean="0"/>
-              <a:t>14-Jan-25</a:t>
+              <a:t>17-Jan-25</a:t>
             </a:fld>
             <a:endParaRPr lang="en-GB"/>
           </a:p>
@@ -28069,7 +28116,7 @@
           <a:p>
             <a:fld id="{CCC9EF8E-048C-4334-AD80-D83F6C532D96}" type="datetime5">
               <a:rPr lang="en-GB" smtClean="0"/>
-              <a:t>14-Jan-25</a:t>
+              <a:t>17-Jan-25</a:t>
             </a:fld>
             <a:endParaRPr lang="en-GB"/>
           </a:p>
@@ -28571,7 +28618,7 @@
           <a:p>
             <a:fld id="{CCC9EF8E-048C-4334-AD80-D83F6C532D96}" type="datetime5">
               <a:rPr lang="en-GB" smtClean="0"/>
-              <a:t>14-Jan-25</a:t>
+              <a:t>17-Jan-25</a:t>
             </a:fld>
             <a:endParaRPr lang="en-GB"/>
           </a:p>
@@ -28654,8 +28701,8 @@
         </p:blipFill>
         <p:spPr>
           <a:xfrm>
-            <a:off x="803868" y="1219378"/>
-            <a:ext cx="6757517" cy="3860303"/>
+            <a:off x="841968" y="990778"/>
+            <a:ext cx="7348067" cy="4193678"/>
           </a:xfrm>
           <a:prstGeom prst="rect">
             <a:avLst/>
@@ -28711,7 +28758,7 @@
         </p:nvSpPr>
         <p:spPr>
           <a:xfrm>
-            <a:off x="2208125" y="5178669"/>
+            <a:off x="2589125" y="5178669"/>
             <a:ext cx="3967842" cy="707886"/>
           </a:xfrm>
           <a:prstGeom prst="rect">
@@ -28811,7 +28858,7 @@
           <a:p>
             <a:fld id="{CCC9EF8E-048C-4334-AD80-D83F6C532D96}" type="datetime5">
               <a:rPr lang="en-GB" smtClean="0"/>
-              <a:t>14-Jan-25</a:t>
+              <a:t>17-Jan-25</a:t>
             </a:fld>
             <a:endParaRPr lang="en-GB"/>
           </a:p>
@@ -29476,7 +29523,7 @@
           <a:p>
             <a:fld id="{CCC9EF8E-048C-4334-AD80-D83F6C532D96}" type="datetime5">
               <a:rPr lang="en-GB" smtClean="0"/>
-              <a:t>14-Jan-25</a:t>
+              <a:t>17-Jan-25</a:t>
             </a:fld>
             <a:endParaRPr lang="en-GB"/>
           </a:p>

</xml_diff>